<commit_message>
added architecture chart to presentation
</commit_message>
<xml_diff>
--- a/docs/presentation.pptx
+++ b/docs/presentation.pptx
@@ -10,7 +10,11 @@
     <p:sldId id="258" r:id="rId4"/>
     <p:sldId id="259" r:id="rId5"/>
     <p:sldId id="261" r:id="rId6"/>
-    <p:sldId id="260" r:id="rId7"/>
+    <p:sldId id="264" r:id="rId7"/>
+    <p:sldId id="263" r:id="rId8"/>
+    <p:sldId id="265" r:id="rId9"/>
+    <p:sldId id="262" r:id="rId10"/>
+    <p:sldId id="260" r:id="rId11"/>
   </p:sldIdLst>
   <p:sldSz cx="12192000" cy="6858000"/>
   <p:notesSz cx="6858000" cy="9144000"/>
@@ -109,6 +113,11 @@
       </a:defRPr>
     </a:lvl9pPr>
   </p:defaultTextStyle>
+  <p:extLst>
+    <p:ext uri="{EFAFB233-063F-42B5-8137-9DF3F51BA10A}">
+      <p15:sldGuideLst xmlns:p15="http://schemas.microsoft.com/office/powerpoint/2012/main"/>
+    </p:ext>
+  </p:extLst>
 </p:presentation>
 </file>
 
@@ -3038,6 +3047,227 @@
 </p:sld>
 </file>
 
+<file path=ppt/slides/slide10.xml><?xml version="1.0" encoding="utf-8"?>
+<p:sld xmlns:a="http://schemas.openxmlformats.org/drawingml/2006/main" xmlns:r="http://schemas.openxmlformats.org/officeDocument/2006/relationships" xmlns:p="http://schemas.openxmlformats.org/presentationml/2006/main">
+  <p:cSld>
+    <p:spTree>
+      <p:nvGrpSpPr>
+        <p:cNvPr id="1" name=""/>
+        <p:cNvGrpSpPr/>
+        <p:nvPr/>
+      </p:nvGrpSpPr>
+      <p:grpSpPr>
+        <a:xfrm>
+          <a:off x="0" y="0"/>
+          <a:ext cx="0" cy="0"/>
+          <a:chOff x="0" y="0"/>
+          <a:chExt cx="0" cy="0"/>
+        </a:xfrm>
+      </p:grpSpPr>
+      <p:sp>
+        <p:nvSpPr>
+          <p:cNvPr id="2" name="Title 1"/>
+          <p:cNvSpPr>
+            <a:spLocks noGrp="1"/>
+          </p:cNvSpPr>
+          <p:nvPr>
+            <p:ph type="title"/>
+          </p:nvPr>
+        </p:nvSpPr>
+        <p:spPr/>
+        <p:txBody>
+          <a:bodyPr/>
+          <a:lstStyle/>
+          <a:p>
+            <a:r>
+              <a:rPr lang="en-US" dirty="0" err="1"/>
+              <a:t>Ergebnisse</a:t>
+            </a:r>
+            <a:endParaRPr lang="de-DE" dirty="0"/>
+          </a:p>
+        </p:txBody>
+      </p:sp>
+      <p:sp>
+        <p:nvSpPr>
+          <p:cNvPr id="3" name="Content Placeholder 2"/>
+          <p:cNvSpPr>
+            <a:spLocks noGrp="1"/>
+          </p:cNvSpPr>
+          <p:nvPr>
+            <p:ph idx="1"/>
+          </p:nvPr>
+        </p:nvSpPr>
+        <p:spPr/>
+        <p:txBody>
+          <a:bodyPr/>
+          <a:lstStyle/>
+          <a:p>
+            <a:r>
+              <a:rPr lang="en-US" dirty="0"/>
+              <a:t>Azure </a:t>
+            </a:r>
+            <a:r>
+              <a:rPr lang="en-US" dirty="0" err="1"/>
+              <a:t>IoT</a:t>
+            </a:r>
+            <a:r>
+              <a:rPr lang="en-US" dirty="0"/>
+              <a:t> Hub </a:t>
+            </a:r>
+            <a:r>
+              <a:rPr lang="en-US" dirty="0" err="1"/>
+              <a:t>Bibliothek</a:t>
+            </a:r>
+            <a:r>
+              <a:rPr lang="en-US" dirty="0"/>
+              <a:t> gut (</a:t>
+            </a:r>
+            <a:r>
+              <a:rPr lang="en-US" dirty="0" err="1"/>
+              <a:t>Zu</a:t>
+            </a:r>
+            <a:r>
+              <a:rPr lang="en-US" dirty="0"/>
+              <a:t> </a:t>
+            </a:r>
+            <a:r>
+              <a:rPr lang="en-US" dirty="0" err="1"/>
+              <a:t>groß</a:t>
+            </a:r>
+            <a:r>
+              <a:rPr lang="en-US" dirty="0"/>
+              <a:t> </a:t>
+            </a:r>
+            <a:r>
+              <a:rPr lang="en-US" dirty="0" err="1"/>
+              <a:t>für</a:t>
+            </a:r>
+            <a:r>
+              <a:rPr lang="en-US" dirty="0"/>
+              <a:t> </a:t>
+            </a:r>
+            <a:r>
+              <a:rPr lang="en-US" dirty="0" err="1"/>
+              <a:t>Adrduino</a:t>
+            </a:r>
+            <a:r>
+              <a:rPr lang="en-US" dirty="0"/>
+              <a:t>)</a:t>
+            </a:r>
+          </a:p>
+          <a:p>
+            <a:r>
+              <a:rPr lang="en-US" dirty="0" err="1"/>
+              <a:t>Sensordaten</a:t>
+            </a:r>
+            <a:r>
+              <a:rPr lang="en-US" dirty="0"/>
+              <a:t> </a:t>
+            </a:r>
+            <a:r>
+              <a:rPr lang="en-US" dirty="0" err="1"/>
+              <a:t>Verarbeitung</a:t>
+            </a:r>
+            <a:r>
+              <a:rPr lang="en-US" dirty="0"/>
+              <a:t> </a:t>
+            </a:r>
+            <a:r>
+              <a:rPr lang="en-US" dirty="0" err="1"/>
+              <a:t>mit</a:t>
+            </a:r>
+            <a:r>
+              <a:rPr lang="en-US" dirty="0"/>
+              <a:t> Stream Analytics </a:t>
+            </a:r>
+            <a:r>
+              <a:rPr lang="en-US" dirty="0" err="1"/>
+              <a:t>schwierig</a:t>
+            </a:r>
+            <a:endParaRPr lang="en-US" dirty="0"/>
+          </a:p>
+          <a:p>
+            <a:pPr lvl="1"/>
+            <a:r>
+              <a:rPr lang="en-US" dirty="0" err="1"/>
+              <a:t>Unregelmäßigkeiten</a:t>
+            </a:r>
+            <a:endParaRPr lang="en-US" dirty="0"/>
+          </a:p>
+          <a:p>
+            <a:pPr lvl="1"/>
+            <a:r>
+              <a:rPr lang="en-US" dirty="0" err="1"/>
+              <a:t>Offlineerkennung</a:t>
+            </a:r>
+            <a:endParaRPr lang="en-US" dirty="0"/>
+          </a:p>
+          <a:p>
+            <a:pPr lvl="1"/>
+            <a:r>
+              <a:rPr lang="en-US" dirty="0" err="1"/>
+              <a:t>Referenzdaten</a:t>
+            </a:r>
+            <a:endParaRPr lang="en-US" dirty="0"/>
+          </a:p>
+          <a:p>
+            <a:pPr lvl="1"/>
+            <a:r>
+              <a:rPr lang="en-US" dirty="0" err="1"/>
+              <a:t>Aggregierung</a:t>
+            </a:r>
+            <a:endParaRPr lang="en-US" dirty="0"/>
+          </a:p>
+          <a:p>
+            <a:pPr lvl="1"/>
+            <a:r>
+              <a:rPr lang="en-US" dirty="0" err="1"/>
+              <a:t>Zeitzonen</a:t>
+            </a:r>
+            <a:endParaRPr lang="en-US" dirty="0"/>
+          </a:p>
+          <a:p>
+            <a:r>
+              <a:rPr lang="en-US" dirty="0"/>
+              <a:t>Cloud </a:t>
+            </a:r>
+            <a:r>
+              <a:rPr lang="en-US" dirty="0" err="1"/>
+              <a:t>bietet</a:t>
+            </a:r>
+            <a:r>
+              <a:rPr lang="en-US" dirty="0"/>
+              <a:t> </a:t>
+            </a:r>
+            <a:r>
+              <a:rPr lang="en-US" dirty="0" err="1"/>
+              <a:t>viele</a:t>
+            </a:r>
+            <a:r>
+              <a:rPr lang="en-US" dirty="0"/>
+              <a:t> </a:t>
+            </a:r>
+            <a:r>
+              <a:rPr lang="en-US" dirty="0" err="1"/>
+              <a:t>Möglichkeiten</a:t>
+            </a:r>
+            <a:endParaRPr lang="en-US" dirty="0"/>
+          </a:p>
+        </p:txBody>
+      </p:sp>
+    </p:spTree>
+    <p:extLst>
+      <p:ext uri="{BB962C8B-B14F-4D97-AF65-F5344CB8AC3E}">
+        <p14:creationId xmlns:p14="http://schemas.microsoft.com/office/powerpoint/2010/main" val="4276223242"/>
+      </p:ext>
+    </p:extLst>
+  </p:cSld>
+  <p:clrMapOvr>
+    <a:masterClrMapping/>
+  </p:clrMapOvr>
+</p:sld>
+</file>
+
 <file path=ppt/slides/slide2.xml><?xml version="1.0" encoding="utf-8"?>
 <p:sld xmlns:a="http://schemas.openxmlformats.org/drawingml/2006/main" xmlns:r="http://schemas.openxmlformats.org/officeDocument/2006/relationships" xmlns:p="http://schemas.openxmlformats.org/presentationml/2006/main">
   <p:cSld>
@@ -3573,11 +3803,7 @@
           <a:bodyPr/>
           <a:lstStyle/>
           <a:p>
-            <a:r>
-              <a:rPr lang="en-US" dirty="0" err="1"/>
-              <a:t>Ergebnisse</a:t>
-            </a:r>
-            <a:endParaRPr lang="de-DE" dirty="0"/>
+            <a:endParaRPr lang="de-DE"/>
           </a:p>
         </p:txBody>
       </p:sp>
@@ -3596,163 +3822,1360 @@
           <a:bodyPr/>
           <a:lstStyle/>
           <a:p>
-            <a:r>
-              <a:rPr lang="en-US" dirty="0"/>
-              <a:t>Azure </a:t>
-            </a:r>
-            <a:r>
-              <a:rPr lang="en-US" dirty="0" err="1"/>
-              <a:t>IoT</a:t>
-            </a:r>
-            <a:r>
-              <a:rPr lang="en-US" dirty="0"/>
-              <a:t> Hub </a:t>
-            </a:r>
-            <a:r>
-              <a:rPr lang="en-US" dirty="0" err="1"/>
-              <a:t>Bibliothek</a:t>
-            </a:r>
-            <a:r>
-              <a:rPr lang="en-US" dirty="0"/>
-              <a:t> gut (</a:t>
-            </a:r>
-            <a:r>
-              <a:rPr lang="en-US" dirty="0" err="1"/>
-              <a:t>Zu</a:t>
-            </a:r>
-            <a:r>
-              <a:rPr lang="en-US" dirty="0"/>
-              <a:t> </a:t>
-            </a:r>
-            <a:r>
-              <a:rPr lang="en-US" dirty="0" err="1"/>
-              <a:t>groß</a:t>
-            </a:r>
-            <a:r>
-              <a:rPr lang="en-US" dirty="0"/>
-              <a:t> </a:t>
-            </a:r>
-            <a:r>
-              <a:rPr lang="en-US" dirty="0" err="1"/>
-              <a:t>für</a:t>
-            </a:r>
-            <a:r>
-              <a:rPr lang="en-US" dirty="0"/>
-              <a:t> </a:t>
-            </a:r>
-            <a:r>
-              <a:rPr lang="en-US" dirty="0" err="1"/>
-              <a:t>Adrduino</a:t>
-            </a:r>
-            <a:r>
-              <a:rPr lang="en-US" dirty="0"/>
-              <a:t>)</a:t>
-            </a:r>
-          </a:p>
-          <a:p>
-            <a:r>
-              <a:rPr lang="en-US" dirty="0" err="1"/>
-              <a:t>Sensordaten</a:t>
-            </a:r>
-            <a:r>
-              <a:rPr lang="en-US" dirty="0"/>
-              <a:t> </a:t>
-            </a:r>
-            <a:r>
-              <a:rPr lang="en-US" dirty="0" err="1"/>
-              <a:t>Verarbeitung</a:t>
-            </a:r>
-            <a:r>
-              <a:rPr lang="en-US" dirty="0"/>
-              <a:t> </a:t>
-            </a:r>
-            <a:r>
-              <a:rPr lang="en-US" dirty="0" err="1"/>
-              <a:t>mit</a:t>
-            </a:r>
-            <a:r>
-              <a:rPr lang="en-US" dirty="0"/>
-              <a:t> Stream Analytics </a:t>
-            </a:r>
-            <a:r>
-              <a:rPr lang="en-US" dirty="0" err="1"/>
-              <a:t>schwierig</a:t>
-            </a:r>
-            <a:endParaRPr lang="en-US" dirty="0"/>
-          </a:p>
-          <a:p>
-            <a:pPr lvl="1"/>
-            <a:r>
-              <a:rPr lang="en-US" dirty="0" err="1"/>
-              <a:t>Unregelmäßigkeiten</a:t>
-            </a:r>
-            <a:endParaRPr lang="en-US" dirty="0"/>
-          </a:p>
-          <a:p>
-            <a:pPr lvl="1"/>
-            <a:r>
-              <a:rPr lang="en-US" dirty="0" err="1"/>
-              <a:t>Offlineerkennung</a:t>
-            </a:r>
-            <a:endParaRPr lang="en-US" dirty="0"/>
-          </a:p>
-          <a:p>
-            <a:pPr lvl="1"/>
-            <a:r>
-              <a:rPr lang="en-US" dirty="0" err="1"/>
-              <a:t>Referenzdaten</a:t>
-            </a:r>
-            <a:endParaRPr lang="en-US" dirty="0"/>
-          </a:p>
-          <a:p>
-            <a:pPr lvl="1"/>
-            <a:r>
-              <a:rPr lang="en-US" dirty="0" err="1"/>
-              <a:t>Aggregierung</a:t>
-            </a:r>
-            <a:endParaRPr lang="en-US" dirty="0"/>
-          </a:p>
-          <a:p>
-            <a:pPr lvl="1"/>
-            <a:r>
-              <a:rPr lang="en-US" dirty="0" err="1"/>
-              <a:t>Zeitzonen</a:t>
-            </a:r>
-            <a:endParaRPr lang="en-US" dirty="0"/>
-          </a:p>
-          <a:p>
-            <a:r>
-              <a:rPr lang="en-US" dirty="0"/>
-              <a:t>Cloud </a:t>
-            </a:r>
-            <a:r>
-              <a:rPr lang="en-US" dirty="0" err="1"/>
-              <a:t>bietet</a:t>
-            </a:r>
-            <a:r>
-              <a:rPr lang="en-US" dirty="0"/>
-              <a:t> </a:t>
-            </a:r>
-            <a:r>
-              <a:rPr lang="en-US" dirty="0" err="1"/>
-              <a:t>viele</a:t>
-            </a:r>
-            <a:r>
-              <a:rPr lang="en-US" dirty="0"/>
-              <a:t> </a:t>
-            </a:r>
-            <a:r>
-              <a:rPr lang="en-US" dirty="0" err="1"/>
-              <a:t>Möglichkeiten</a:t>
-            </a:r>
-            <a:endParaRPr lang="en-US" dirty="0"/>
+            <a:endParaRPr lang="de-DE"/>
           </a:p>
         </p:txBody>
       </p:sp>
     </p:spTree>
     <p:extLst>
       <p:ext uri="{BB962C8B-B14F-4D97-AF65-F5344CB8AC3E}">
-        <p14:creationId xmlns:p14="http://schemas.microsoft.com/office/powerpoint/2010/main" val="4276223242"/>
+        <p14:creationId xmlns:p14="http://schemas.microsoft.com/office/powerpoint/2010/main" val="1623428314"/>
+      </p:ext>
+    </p:extLst>
+  </p:cSld>
+  <p:clrMapOvr>
+    <a:masterClrMapping/>
+  </p:clrMapOvr>
+</p:sld>
+</file>
+
+<file path=ppt/slides/slide7.xml><?xml version="1.0" encoding="utf-8"?>
+<p:sld xmlns:a="http://schemas.openxmlformats.org/drawingml/2006/main" xmlns:r="http://schemas.openxmlformats.org/officeDocument/2006/relationships" xmlns:p="http://schemas.openxmlformats.org/presentationml/2006/main">
+  <p:cSld>
+    <p:spTree>
+      <p:nvGrpSpPr>
+        <p:cNvPr id="1" name=""/>
+        <p:cNvGrpSpPr/>
+        <p:nvPr/>
+      </p:nvGrpSpPr>
+      <p:grpSpPr>
+        <a:xfrm>
+          <a:off x="0" y="0"/>
+          <a:ext cx="0" cy="0"/>
+          <a:chOff x="0" y="0"/>
+          <a:chExt cx="0" cy="0"/>
+        </a:xfrm>
+      </p:grpSpPr>
+      <p:sp>
+        <p:nvSpPr>
+          <p:cNvPr id="2" name="Title 1"/>
+          <p:cNvSpPr>
+            <a:spLocks noGrp="1"/>
+          </p:cNvSpPr>
+          <p:nvPr>
+            <p:ph type="title"/>
+          </p:nvPr>
+        </p:nvSpPr>
+        <p:spPr/>
+        <p:txBody>
+          <a:bodyPr/>
+          <a:lstStyle/>
+          <a:p>
+            <a:endParaRPr lang="de-DE"/>
+          </a:p>
+        </p:txBody>
+      </p:sp>
+      <p:sp>
+        <p:nvSpPr>
+          <p:cNvPr id="3" name="Content Placeholder 2"/>
+          <p:cNvSpPr>
+            <a:spLocks noGrp="1"/>
+          </p:cNvSpPr>
+          <p:nvPr>
+            <p:ph idx="1"/>
+          </p:nvPr>
+        </p:nvSpPr>
+        <p:spPr/>
+        <p:txBody>
+          <a:bodyPr/>
+          <a:lstStyle/>
+          <a:p>
+            <a:endParaRPr lang="de-DE"/>
+          </a:p>
+        </p:txBody>
+      </p:sp>
+    </p:spTree>
+    <p:extLst>
+      <p:ext uri="{BB962C8B-B14F-4D97-AF65-F5344CB8AC3E}">
+        <p14:creationId xmlns:p14="http://schemas.microsoft.com/office/powerpoint/2010/main" val="3309690306"/>
+      </p:ext>
+    </p:extLst>
+  </p:cSld>
+  <p:clrMapOvr>
+    <a:masterClrMapping/>
+  </p:clrMapOvr>
+</p:sld>
+</file>
+
+<file path=ppt/slides/slide8.xml><?xml version="1.0" encoding="utf-8"?>
+<p:sld xmlns:a="http://schemas.openxmlformats.org/drawingml/2006/main" xmlns:r="http://schemas.openxmlformats.org/officeDocument/2006/relationships" xmlns:p="http://schemas.openxmlformats.org/presentationml/2006/main">
+  <p:cSld>
+    <p:spTree>
+      <p:nvGrpSpPr>
+        <p:cNvPr id="1" name=""/>
+        <p:cNvGrpSpPr/>
+        <p:nvPr/>
+      </p:nvGrpSpPr>
+      <p:grpSpPr>
+        <a:xfrm>
+          <a:off x="0" y="0"/>
+          <a:ext cx="0" cy="0"/>
+          <a:chOff x="0" y="0"/>
+          <a:chExt cx="0" cy="0"/>
+        </a:xfrm>
+      </p:grpSpPr>
+      <p:sp>
+        <p:nvSpPr>
+          <p:cNvPr id="2" name="Title 1"/>
+          <p:cNvSpPr>
+            <a:spLocks noGrp="1"/>
+          </p:cNvSpPr>
+          <p:nvPr>
+            <p:ph type="title"/>
+          </p:nvPr>
+        </p:nvSpPr>
+        <p:spPr/>
+        <p:txBody>
+          <a:bodyPr/>
+          <a:lstStyle/>
+          <a:p>
+            <a:endParaRPr lang="de-DE"/>
+          </a:p>
+        </p:txBody>
+      </p:sp>
+      <p:sp>
+        <p:nvSpPr>
+          <p:cNvPr id="3" name="Content Placeholder 2"/>
+          <p:cNvSpPr>
+            <a:spLocks noGrp="1"/>
+          </p:cNvSpPr>
+          <p:nvPr>
+            <p:ph idx="1"/>
+          </p:nvPr>
+        </p:nvSpPr>
+        <p:spPr/>
+        <p:txBody>
+          <a:bodyPr/>
+          <a:lstStyle/>
+          <a:p>
+            <a:endParaRPr lang="de-DE"/>
+          </a:p>
+        </p:txBody>
+      </p:sp>
+    </p:spTree>
+    <p:extLst>
+      <p:ext uri="{BB962C8B-B14F-4D97-AF65-F5344CB8AC3E}">
+        <p14:creationId xmlns:p14="http://schemas.microsoft.com/office/powerpoint/2010/main" val="1629447735"/>
+      </p:ext>
+    </p:extLst>
+  </p:cSld>
+  <p:clrMapOvr>
+    <a:masterClrMapping/>
+  </p:clrMapOvr>
+</p:sld>
+</file>
+
+<file path=ppt/slides/slide9.xml><?xml version="1.0" encoding="utf-8"?>
+<p:sld xmlns:a="http://schemas.openxmlformats.org/drawingml/2006/main" xmlns:r="http://schemas.openxmlformats.org/officeDocument/2006/relationships" xmlns:p="http://schemas.openxmlformats.org/presentationml/2006/main">
+  <p:cSld>
+    <p:spTree>
+      <p:nvGrpSpPr>
+        <p:cNvPr id="1" name=""/>
+        <p:cNvGrpSpPr/>
+        <p:nvPr/>
+      </p:nvGrpSpPr>
+      <p:grpSpPr>
+        <a:xfrm>
+          <a:off x="0" y="0"/>
+          <a:ext cx="0" cy="0"/>
+          <a:chOff x="0" y="0"/>
+          <a:chExt cx="0" cy="0"/>
+        </a:xfrm>
+      </p:grpSpPr>
+      <p:sp>
+        <p:nvSpPr>
+          <p:cNvPr id="2" name="Title 1"/>
+          <p:cNvSpPr>
+            <a:spLocks noGrp="1"/>
+          </p:cNvSpPr>
+          <p:nvPr>
+            <p:ph type="title"/>
+          </p:nvPr>
+        </p:nvSpPr>
+        <p:spPr>
+          <a:xfrm>
+            <a:off x="539151" y="3909191"/>
+            <a:ext cx="10515600" cy="692815"/>
+          </a:xfrm>
+        </p:spPr>
+        <p:txBody>
+          <a:bodyPr>
+            <a:normAutofit fontScale="90000"/>
+          </a:bodyPr>
+          <a:lstStyle/>
+          <a:p>
+            <a:r>
+              <a:rPr lang="en-US" dirty="0" err="1"/>
+              <a:t>Architektur</a:t>
+            </a:r>
+            <a:endParaRPr lang="de-DE" dirty="0"/>
+          </a:p>
+        </p:txBody>
+      </p:sp>
+      <p:pic>
+        <p:nvPicPr>
+          <p:cNvPr id="6" name="Content Placeholder 5"/>
+          <p:cNvPicPr>
+            <a:picLocks noGrp="1" noChangeAspect="1"/>
+          </p:cNvPicPr>
+          <p:nvPr>
+            <p:ph idx="1"/>
+          </p:nvPr>
+        </p:nvPicPr>
+        <p:blipFill>
+          <a:blip r:embed="rId2"/>
+          <a:stretch>
+            <a:fillRect/>
+          </a:stretch>
+        </p:blipFill>
+        <p:spPr>
+          <a:xfrm flipH="1">
+            <a:off x="4369096" y="1370560"/>
+            <a:ext cx="635480" cy="624331"/>
+          </a:xfrm>
+          <a:prstGeom prst="rect">
+            <a:avLst/>
+          </a:prstGeom>
+        </p:spPr>
+      </p:pic>
+      <p:pic>
+        <p:nvPicPr>
+          <p:cNvPr id="1026" name="Picture 2" descr="https://bots.botframework.com/Client/Images/bot-framework-default-7.png"/>
+          <p:cNvPicPr>
+            <a:picLocks noChangeAspect="1" noChangeArrowheads="1"/>
+          </p:cNvPicPr>
+          <p:nvPr/>
+        </p:nvPicPr>
+        <p:blipFill>
+          <a:blip r:embed="rId3">
+            <a:extLst>
+              <a:ext uri="{28A0092B-C50C-407E-A947-70E740481C1C}">
+                <a14:useLocalDpi xmlns:a14="http://schemas.microsoft.com/office/drawing/2010/main" val="0"/>
+              </a:ext>
+            </a:extLst>
+          </a:blip>
+          <a:srcRect/>
+          <a:stretch>
+            <a:fillRect/>
+          </a:stretch>
+        </p:blipFill>
+        <p:spPr bwMode="auto">
+          <a:xfrm>
+            <a:off x="9362013" y="1955636"/>
+            <a:ext cx="614030" cy="614030"/>
+          </a:xfrm>
+          <a:prstGeom prst="rect">
+            <a:avLst/>
+          </a:prstGeom>
+          <a:noFill/>
+          <a:extLst>
+            <a:ext uri="{909E8E84-426E-40DD-AFC4-6F175D3DCCD1}">
+              <a14:hiddenFill xmlns:a14="http://schemas.microsoft.com/office/drawing/2010/main">
+                <a:solidFill>
+                  <a:srgbClr val="FFFFFF"/>
+                </a:solidFill>
+              </a14:hiddenFill>
+            </a:ext>
+          </a:extLst>
+        </p:spPr>
+      </p:pic>
+      <p:pic>
+        <p:nvPicPr>
+          <p:cNvPr id="4" name="Picture 3"/>
+          <p:cNvPicPr>
+            <a:picLocks noChangeAspect="1"/>
+          </p:cNvPicPr>
+          <p:nvPr/>
+        </p:nvPicPr>
+        <p:blipFill>
+          <a:blip r:embed="rId4"/>
+          <a:stretch>
+            <a:fillRect/>
+          </a:stretch>
+        </p:blipFill>
+        <p:spPr>
+          <a:xfrm>
+            <a:off x="6029781" y="776649"/>
+            <a:ext cx="657598" cy="646260"/>
+          </a:xfrm>
+          <a:prstGeom prst="rect">
+            <a:avLst/>
+          </a:prstGeom>
+        </p:spPr>
+      </p:pic>
+      <p:pic>
+        <p:nvPicPr>
+          <p:cNvPr id="1030" name="Picture 6" descr="BEKANT Schreibtisch sitz/steh IKEA Die elektrische Höhenregulierung zwischen 65 und 125 cm verhilft zu ergonomisch richtiger Arbeitshaltung."/>
+          <p:cNvPicPr>
+            <a:picLocks noChangeAspect="1" noChangeArrowheads="1"/>
+          </p:cNvPicPr>
+          <p:nvPr/>
+        </p:nvPicPr>
+        <p:blipFill rotWithShape="1">
+          <a:blip r:embed="rId5">
+            <a:extLst>
+              <a:ext uri="{28A0092B-C50C-407E-A947-70E740481C1C}">
+                <a14:useLocalDpi xmlns:a14="http://schemas.microsoft.com/office/drawing/2010/main" val="0"/>
+              </a:ext>
+            </a:extLst>
+          </a:blip>
+          <a:srcRect t="23974" b="24023"/>
+          <a:stretch/>
+        </p:blipFill>
+        <p:spPr bwMode="auto">
+          <a:xfrm>
+            <a:off x="4003338" y="4999885"/>
+            <a:ext cx="3500443" cy="1820347"/>
+          </a:xfrm>
+          <a:prstGeom prst="rect">
+            <a:avLst/>
+          </a:prstGeom>
+          <a:noFill/>
+          <a:extLst>
+            <a:ext uri="{909E8E84-426E-40DD-AFC4-6F175D3DCCD1}">
+              <a14:hiddenFill xmlns:a14="http://schemas.microsoft.com/office/drawing/2010/main">
+                <a:solidFill>
+                  <a:srgbClr val="FFFFFF"/>
+                </a:solidFill>
+              </a14:hiddenFill>
+            </a:ext>
+          </a:extLst>
+        </p:spPr>
+      </p:pic>
+      <p:pic>
+        <p:nvPicPr>
+          <p:cNvPr id="1028" name="Picture 4" descr="http://cdn-reichelt.de/bilder/web/xxl_ws/A300/ARDUINO_R3.png"/>
+          <p:cNvPicPr>
+            <a:picLocks noChangeAspect="1" noChangeArrowheads="1"/>
+          </p:cNvPicPr>
+          <p:nvPr/>
+        </p:nvPicPr>
+        <p:blipFill>
+          <a:blip r:embed="rId6">
+            <a:extLst>
+              <a:ext uri="{28A0092B-C50C-407E-A947-70E740481C1C}">
+                <a14:useLocalDpi xmlns:a14="http://schemas.microsoft.com/office/drawing/2010/main" val="0"/>
+              </a:ext>
+            </a:extLst>
+          </a:blip>
+          <a:srcRect/>
+          <a:stretch>
+            <a:fillRect/>
+          </a:stretch>
+        </p:blipFill>
+        <p:spPr bwMode="auto">
+          <a:xfrm>
+            <a:off x="6715334" y="4319607"/>
+            <a:ext cx="1283416" cy="998761"/>
+          </a:xfrm>
+          <a:prstGeom prst="rect">
+            <a:avLst/>
+          </a:prstGeom>
+          <a:noFill/>
+          <a:extLst>
+            <a:ext uri="{909E8E84-426E-40DD-AFC4-6F175D3DCCD1}">
+              <a14:hiddenFill xmlns:a14="http://schemas.microsoft.com/office/drawing/2010/main">
+                <a:solidFill>
+                  <a:srgbClr val="FFFFFF"/>
+                </a:solidFill>
+              </a14:hiddenFill>
+            </a:ext>
+          </a:extLst>
+        </p:spPr>
+      </p:pic>
+      <p:grpSp>
+        <p:nvGrpSpPr>
+          <p:cNvPr id="8" name="Group 7"/>
+          <p:cNvGrpSpPr/>
+          <p:nvPr/>
+        </p:nvGrpSpPr>
+        <p:grpSpPr>
+          <a:xfrm>
+            <a:off x="4242464" y="2351642"/>
+            <a:ext cx="934871" cy="1025338"/>
+            <a:chOff x="2137217" y="2275517"/>
+            <a:chExt cx="934871" cy="1025338"/>
+          </a:xfrm>
+        </p:grpSpPr>
+        <p:pic>
+          <p:nvPicPr>
+            <p:cNvPr id="5" name="Picture 4"/>
+            <p:cNvPicPr>
+              <a:picLocks noChangeAspect="1"/>
+            </p:cNvPicPr>
+            <p:nvPr/>
+          </p:nvPicPr>
+          <p:blipFill>
+            <a:blip r:embed="rId7"/>
+            <a:stretch>
+              <a:fillRect/>
+            </a:stretch>
+          </p:blipFill>
+          <p:spPr>
+            <a:xfrm>
+              <a:off x="2263849" y="2636874"/>
+              <a:ext cx="681609" cy="663981"/>
+            </a:xfrm>
+            <a:prstGeom prst="rect">
+              <a:avLst/>
+            </a:prstGeom>
+          </p:spPr>
+        </p:pic>
+        <p:sp>
+          <p:nvSpPr>
+            <p:cNvPr id="7" name="TextBox 6"/>
+            <p:cNvSpPr txBox="1"/>
+            <p:nvPr/>
+          </p:nvSpPr>
+          <p:spPr>
+            <a:xfrm>
+              <a:off x="2137217" y="2275517"/>
+              <a:ext cx="934871" cy="369332"/>
+            </a:xfrm>
+            <a:prstGeom prst="rect">
+              <a:avLst/>
+            </a:prstGeom>
+            <a:noFill/>
+          </p:spPr>
+          <p:txBody>
+            <a:bodyPr wrap="none" rtlCol="0">
+              <a:spAutoFit/>
+            </a:bodyPr>
+            <a:lstStyle/>
+            <a:p>
+              <a:r>
+                <a:rPr lang="en-US" dirty="0" err="1"/>
+                <a:t>IoT</a:t>
+              </a:r>
+              <a:r>
+                <a:rPr lang="en-US" dirty="0"/>
+                <a:t>-Hub</a:t>
+              </a:r>
+              <a:endParaRPr lang="de-DE" dirty="0"/>
+            </a:p>
+          </p:txBody>
+        </p:sp>
+      </p:grpSp>
+      <p:sp>
+        <p:nvSpPr>
+          <p:cNvPr id="12" name="TextBox 11"/>
+          <p:cNvSpPr txBox="1"/>
+          <p:nvPr/>
+        </p:nvSpPr>
+        <p:spPr>
+          <a:xfrm>
+            <a:off x="3812366" y="1024010"/>
+            <a:ext cx="1748940" cy="369332"/>
+          </a:xfrm>
+          <a:prstGeom prst="rect">
+            <a:avLst/>
+          </a:prstGeom>
+          <a:noFill/>
+        </p:spPr>
+        <p:txBody>
+          <a:bodyPr wrap="none" rtlCol="0">
+            <a:spAutoFit/>
+          </a:bodyPr>
+          <a:lstStyle/>
+          <a:p>
+            <a:r>
+              <a:rPr lang="en-US" dirty="0"/>
+              <a:t>Stream Analytics</a:t>
+            </a:r>
+            <a:endParaRPr lang="de-DE" dirty="0"/>
+          </a:p>
+        </p:txBody>
+      </p:sp>
+      <p:sp>
+        <p:nvSpPr>
+          <p:cNvPr id="13" name="TextBox 12"/>
+          <p:cNvSpPr txBox="1"/>
+          <p:nvPr/>
+        </p:nvSpPr>
+        <p:spPr>
+          <a:xfrm>
+            <a:off x="5673585" y="445342"/>
+            <a:ext cx="1369990" cy="369332"/>
+          </a:xfrm>
+          <a:prstGeom prst="rect">
+            <a:avLst/>
+          </a:prstGeom>
+          <a:noFill/>
+        </p:spPr>
+        <p:txBody>
+          <a:bodyPr wrap="none" rtlCol="0">
+            <a:spAutoFit/>
+          </a:bodyPr>
+          <a:lstStyle/>
+          <a:p>
+            <a:r>
+              <a:rPr lang="en-US" dirty="0"/>
+              <a:t>Blob Storage</a:t>
+            </a:r>
+            <a:endParaRPr lang="de-DE" dirty="0"/>
+          </a:p>
+        </p:txBody>
+      </p:sp>
+      <p:pic>
+        <p:nvPicPr>
+          <p:cNvPr id="14" name="Picture 13"/>
+          <p:cNvPicPr>
+            <a:picLocks noChangeAspect="1"/>
+          </p:cNvPicPr>
+          <p:nvPr/>
+        </p:nvPicPr>
+        <p:blipFill>
+          <a:blip r:embed="rId4"/>
+          <a:stretch>
+            <a:fillRect/>
+          </a:stretch>
+        </p:blipFill>
+        <p:spPr>
+          <a:xfrm>
+            <a:off x="6029781" y="2113633"/>
+            <a:ext cx="657598" cy="646260"/>
+          </a:xfrm>
+          <a:prstGeom prst="rect">
+            <a:avLst/>
+          </a:prstGeom>
+        </p:spPr>
+      </p:pic>
+      <p:sp>
+        <p:nvSpPr>
+          <p:cNvPr id="15" name="TextBox 14"/>
+          <p:cNvSpPr txBox="1"/>
+          <p:nvPr/>
+        </p:nvSpPr>
+        <p:spPr>
+          <a:xfrm>
+            <a:off x="5636908" y="1769054"/>
+            <a:ext cx="1443344" cy="369332"/>
+          </a:xfrm>
+          <a:prstGeom prst="rect">
+            <a:avLst/>
+          </a:prstGeom>
+          <a:noFill/>
+        </p:spPr>
+        <p:txBody>
+          <a:bodyPr wrap="none" rtlCol="0">
+            <a:spAutoFit/>
+          </a:bodyPr>
+          <a:lstStyle/>
+          <a:p>
+            <a:r>
+              <a:rPr lang="en-US" dirty="0"/>
+              <a:t>Table Storage</a:t>
+            </a:r>
+            <a:endParaRPr lang="de-DE" dirty="0"/>
+          </a:p>
+        </p:txBody>
+      </p:sp>
+      <p:pic>
+        <p:nvPicPr>
+          <p:cNvPr id="9" name="Picture 8"/>
+          <p:cNvPicPr>
+            <a:picLocks noChangeAspect="1"/>
+          </p:cNvPicPr>
+          <p:nvPr/>
+        </p:nvPicPr>
+        <p:blipFill>
+          <a:blip r:embed="rId8"/>
+          <a:stretch>
+            <a:fillRect/>
+          </a:stretch>
+        </p:blipFill>
+        <p:spPr>
+          <a:xfrm>
+            <a:off x="7717222" y="637844"/>
+            <a:ext cx="655231" cy="626988"/>
+          </a:xfrm>
+          <a:prstGeom prst="rect">
+            <a:avLst/>
+          </a:prstGeom>
+        </p:spPr>
+      </p:pic>
+      <p:sp>
+        <p:nvSpPr>
+          <p:cNvPr id="17" name="TextBox 16"/>
+          <p:cNvSpPr txBox="1"/>
+          <p:nvPr/>
+        </p:nvSpPr>
+        <p:spPr>
+          <a:xfrm>
+            <a:off x="7601446" y="310161"/>
+            <a:ext cx="888385" cy="369332"/>
+          </a:xfrm>
+          <a:prstGeom prst="rect">
+            <a:avLst/>
+          </a:prstGeom>
+          <a:noFill/>
+        </p:spPr>
+        <p:txBody>
+          <a:bodyPr wrap="none" rtlCol="0">
+            <a:spAutoFit/>
+          </a:bodyPr>
+          <a:lstStyle/>
+          <a:p>
+            <a:r>
+              <a:rPr lang="en-US" dirty="0"/>
+              <a:t>Bot-API</a:t>
+            </a:r>
+            <a:endParaRPr lang="de-DE" dirty="0"/>
+          </a:p>
+        </p:txBody>
+      </p:sp>
+      <p:sp>
+        <p:nvSpPr>
+          <p:cNvPr id="23" name="TextBox 22"/>
+          <p:cNvSpPr txBox="1"/>
+          <p:nvPr/>
+        </p:nvSpPr>
+        <p:spPr>
+          <a:xfrm>
+            <a:off x="8890129" y="1632506"/>
+            <a:ext cx="1557799" cy="369332"/>
+          </a:xfrm>
+          <a:prstGeom prst="rect">
+            <a:avLst/>
+          </a:prstGeom>
+          <a:noFill/>
+        </p:spPr>
+        <p:txBody>
+          <a:bodyPr wrap="none" rtlCol="0">
+            <a:spAutoFit/>
+          </a:bodyPr>
+          <a:lstStyle/>
+          <a:p>
+            <a:r>
+              <a:rPr lang="en-US" dirty="0"/>
+              <a:t>Bot-Connector</a:t>
+            </a:r>
+            <a:endParaRPr lang="de-DE" dirty="0"/>
+          </a:p>
+        </p:txBody>
+      </p:sp>
+      <p:pic>
+        <p:nvPicPr>
+          <p:cNvPr id="10" name="Picture 9"/>
+          <p:cNvPicPr>
+            <a:picLocks noChangeAspect="1"/>
+          </p:cNvPicPr>
+          <p:nvPr/>
+        </p:nvPicPr>
+        <p:blipFill>
+          <a:blip r:embed="rId9">
+            <a:extLst>
+              <a:ext uri="{28A0092B-C50C-407E-A947-70E740481C1C}">
+                <a14:useLocalDpi xmlns:a14="http://schemas.microsoft.com/office/drawing/2010/main" val="0"/>
+              </a:ext>
+            </a:extLst>
+          </a:blip>
+          <a:stretch>
+            <a:fillRect/>
+          </a:stretch>
+        </p:blipFill>
+        <p:spPr>
+          <a:xfrm>
+            <a:off x="4389601" y="3949744"/>
+            <a:ext cx="1558576" cy="1558576"/>
+          </a:xfrm>
+          <a:prstGeom prst="rect">
+            <a:avLst/>
+          </a:prstGeom>
+        </p:spPr>
+      </p:pic>
+      <p:pic>
+        <p:nvPicPr>
+          <p:cNvPr id="1034" name="Picture 10" descr="https://cdn1.iconfinder.com/data/icons/logotypes/32/chrome-512.png"/>
+          <p:cNvPicPr>
+            <a:picLocks noChangeAspect="1" noChangeArrowheads="1"/>
+          </p:cNvPicPr>
+          <p:nvPr/>
+        </p:nvPicPr>
+        <p:blipFill>
+          <a:blip r:embed="rId10">
+            <a:extLst>
+              <a:ext uri="{28A0092B-C50C-407E-A947-70E740481C1C}">
+                <a14:useLocalDpi xmlns:a14="http://schemas.microsoft.com/office/drawing/2010/main" val="0"/>
+              </a:ext>
+            </a:extLst>
+          </a:blip>
+          <a:srcRect/>
+          <a:stretch>
+            <a:fillRect/>
+          </a:stretch>
+        </p:blipFill>
+        <p:spPr bwMode="auto">
+          <a:xfrm>
+            <a:off x="4842985" y="3964343"/>
+            <a:ext cx="610577" cy="610577"/>
+          </a:xfrm>
+          <a:prstGeom prst="rect">
+            <a:avLst/>
+          </a:prstGeom>
+          <a:noFill/>
+          <a:extLst>
+            <a:ext uri="{909E8E84-426E-40DD-AFC4-6F175D3DCCD1}">
+              <a14:hiddenFill xmlns:a14="http://schemas.microsoft.com/office/drawing/2010/main">
+                <a:solidFill>
+                  <a:srgbClr val="FFFFFF"/>
+                </a:solidFill>
+              </a14:hiddenFill>
+            </a:ext>
+          </a:extLst>
+        </p:spPr>
+      </p:pic>
+      <p:pic>
+        <p:nvPicPr>
+          <p:cNvPr id="1036" name="Picture 12" descr="https://cdn2.iconfinder.com/data/icons/windows-8-metro-style/512/console.png"/>
+          <p:cNvPicPr>
+            <a:picLocks noChangeAspect="1" noChangeArrowheads="1"/>
+          </p:cNvPicPr>
+          <p:nvPr/>
+        </p:nvPicPr>
+        <p:blipFill>
+          <a:blip r:embed="rId11">
+            <a:extLst>
+              <a:ext uri="{28A0092B-C50C-407E-A947-70E740481C1C}">
+                <a14:useLocalDpi xmlns:a14="http://schemas.microsoft.com/office/drawing/2010/main" val="0"/>
+              </a:ext>
+            </a:extLst>
+          </a:blip>
+          <a:srcRect/>
+          <a:stretch>
+            <a:fillRect/>
+          </a:stretch>
+        </p:blipFill>
+        <p:spPr bwMode="auto">
+          <a:xfrm>
+            <a:off x="3941258" y="3882526"/>
+            <a:ext cx="767317" cy="767317"/>
+          </a:xfrm>
+          <a:prstGeom prst="rect">
+            <a:avLst/>
+          </a:prstGeom>
+          <a:noFill/>
+          <a:extLst>
+            <a:ext uri="{909E8E84-426E-40DD-AFC4-6F175D3DCCD1}">
+              <a14:hiddenFill xmlns:a14="http://schemas.microsoft.com/office/drawing/2010/main">
+                <a:solidFill>
+                  <a:srgbClr val="FFFFFF"/>
+                </a:solidFill>
+              </a14:hiddenFill>
+            </a:ext>
+          </a:extLst>
+        </p:spPr>
+      </p:pic>
+      <p:pic>
+        <p:nvPicPr>
+          <p:cNvPr id="1032" name="Picture 8" descr="http://a4.mzstatic.com/eu/r30/Purple20/v4/87/58/db/8758db69-273c-c2bc-0f47-9d9876660c87/icon175x175.jpeg"/>
+          <p:cNvPicPr>
+            <a:picLocks noChangeAspect="1" noChangeArrowheads="1"/>
+          </p:cNvPicPr>
+          <p:nvPr/>
+        </p:nvPicPr>
+        <p:blipFill>
+          <a:blip r:embed="rId12">
+            <a:extLst>
+              <a:ext uri="{28A0092B-C50C-407E-A947-70E740481C1C}">
+                <a14:useLocalDpi xmlns:a14="http://schemas.microsoft.com/office/drawing/2010/main" val="0"/>
+              </a:ext>
+            </a:extLst>
+          </a:blip>
+          <a:srcRect/>
+          <a:stretch>
+            <a:fillRect/>
+          </a:stretch>
+        </p:blipFill>
+        <p:spPr bwMode="auto">
+          <a:xfrm>
+            <a:off x="5599117" y="3964343"/>
+            <a:ext cx="606277" cy="606277"/>
+          </a:xfrm>
+          <a:prstGeom prst="rect">
+            <a:avLst/>
+          </a:prstGeom>
+          <a:noFill/>
+          <a:extLst>
+            <a:ext uri="{909E8E84-426E-40DD-AFC4-6F175D3DCCD1}">
+              <a14:hiddenFill xmlns:a14="http://schemas.microsoft.com/office/drawing/2010/main">
+                <a:solidFill>
+                  <a:srgbClr val="FFFFFF"/>
+                </a:solidFill>
+              </a14:hiddenFill>
+            </a:ext>
+          </a:extLst>
+        </p:spPr>
+      </p:pic>
+      <p:pic>
+        <p:nvPicPr>
+          <p:cNvPr id="28" name="Picture 27"/>
+          <p:cNvPicPr>
+            <a:picLocks noChangeAspect="1"/>
+          </p:cNvPicPr>
+          <p:nvPr/>
+        </p:nvPicPr>
+        <p:blipFill>
+          <a:blip r:embed="rId8"/>
+          <a:stretch>
+            <a:fillRect/>
+          </a:stretch>
+        </p:blipFill>
+        <p:spPr>
+          <a:xfrm>
+            <a:off x="7749367" y="1965856"/>
+            <a:ext cx="655231" cy="626988"/>
+          </a:xfrm>
+          <a:prstGeom prst="rect">
+            <a:avLst/>
+          </a:prstGeom>
+        </p:spPr>
+      </p:pic>
+      <p:sp>
+        <p:nvSpPr>
+          <p:cNvPr id="29" name="TextBox 28"/>
+          <p:cNvSpPr txBox="1"/>
+          <p:nvPr/>
+        </p:nvSpPr>
+        <p:spPr>
+          <a:xfrm>
+            <a:off x="7570750" y="1586304"/>
+            <a:ext cx="1065869" cy="369332"/>
+          </a:xfrm>
+          <a:prstGeom prst="rect">
+            <a:avLst/>
+          </a:prstGeom>
+          <a:noFill/>
+        </p:spPr>
+        <p:txBody>
+          <a:bodyPr wrap="none" rtlCol="0">
+            <a:spAutoFit/>
+          </a:bodyPr>
+          <a:lstStyle/>
+          <a:p>
+            <a:r>
+              <a:rPr lang="en-US" dirty="0"/>
+              <a:t>Web-App</a:t>
+            </a:r>
+            <a:endParaRPr lang="de-DE" dirty="0"/>
+          </a:p>
+        </p:txBody>
+      </p:sp>
+      <p:pic>
+        <p:nvPicPr>
+          <p:cNvPr id="30" name="Picture 29"/>
+          <p:cNvPicPr>
+            <a:picLocks noChangeAspect="1"/>
+          </p:cNvPicPr>
+          <p:nvPr/>
+        </p:nvPicPr>
+        <p:blipFill>
+          <a:blip r:embed="rId8"/>
+          <a:stretch>
+            <a:fillRect/>
+          </a:stretch>
+        </p:blipFill>
+        <p:spPr>
+          <a:xfrm>
+            <a:off x="2557677" y="1370045"/>
+            <a:ext cx="655231" cy="626988"/>
+          </a:xfrm>
+          <a:prstGeom prst="rect">
+            <a:avLst/>
+          </a:prstGeom>
+        </p:spPr>
+      </p:pic>
+      <p:sp>
+        <p:nvSpPr>
+          <p:cNvPr id="31" name="TextBox 30"/>
+          <p:cNvSpPr txBox="1"/>
+          <p:nvPr/>
+        </p:nvSpPr>
+        <p:spPr>
+          <a:xfrm>
+            <a:off x="2063111" y="1054269"/>
+            <a:ext cx="1644361" cy="369332"/>
+          </a:xfrm>
+          <a:prstGeom prst="rect">
+            <a:avLst/>
+          </a:prstGeom>
+          <a:noFill/>
+        </p:spPr>
+        <p:txBody>
+          <a:bodyPr wrap="none" rtlCol="0">
+            <a:spAutoFit/>
+          </a:bodyPr>
+          <a:lstStyle/>
+          <a:p>
+            <a:r>
+              <a:rPr lang="en-US" dirty="0"/>
+              <a:t>Offline-Tick-Job</a:t>
+            </a:r>
+            <a:endParaRPr lang="de-DE" dirty="0"/>
+          </a:p>
+        </p:txBody>
+      </p:sp>
+      <p:cxnSp>
+        <p:nvCxnSpPr>
+          <p:cNvPr id="1024" name="Straight Arrow Connector 1023"/>
+          <p:cNvCxnSpPr/>
+          <p:nvPr/>
+        </p:nvCxnSpPr>
+        <p:spPr>
+          <a:xfrm flipH="1" flipV="1">
+            <a:off x="5842591" y="4774019"/>
+            <a:ext cx="781493" cy="5316"/>
+          </a:xfrm>
+          <a:prstGeom prst="straightConnector1">
+            <a:avLst/>
+          </a:prstGeom>
+          <a:ln w="57150">
+            <a:tailEnd type="triangle"/>
+          </a:ln>
+        </p:spPr>
+        <p:style>
+          <a:lnRef idx="1">
+            <a:schemeClr val="accent1"/>
+          </a:lnRef>
+          <a:fillRef idx="0">
+            <a:schemeClr val="accent1"/>
+          </a:fillRef>
+          <a:effectRef idx="0">
+            <a:schemeClr val="accent1"/>
+          </a:effectRef>
+          <a:fontRef idx="minor">
+            <a:schemeClr val="tx1"/>
+          </a:fontRef>
+        </p:style>
+      </p:cxnSp>
+      <p:cxnSp>
+        <p:nvCxnSpPr>
+          <p:cNvPr id="39" name="Straight Arrow Connector 38"/>
+          <p:cNvCxnSpPr>
+            <a:stCxn id="1036" idx="0"/>
+            <a:endCxn id="5" idx="2"/>
+          </p:cNvCxnSpPr>
+          <p:nvPr/>
+        </p:nvCxnSpPr>
+        <p:spPr>
+          <a:xfrm flipV="1">
+            <a:off x="4324917" y="3376980"/>
+            <a:ext cx="384984" cy="505546"/>
+          </a:xfrm>
+          <a:prstGeom prst="straightConnector1">
+            <a:avLst/>
+          </a:prstGeom>
+          <a:ln w="57150">
+            <a:tailEnd type="triangle"/>
+          </a:ln>
+        </p:spPr>
+        <p:style>
+          <a:lnRef idx="1">
+            <a:schemeClr val="accent1"/>
+          </a:lnRef>
+          <a:fillRef idx="0">
+            <a:schemeClr val="accent1"/>
+          </a:fillRef>
+          <a:effectRef idx="0">
+            <a:schemeClr val="accent1"/>
+          </a:effectRef>
+          <a:fontRef idx="minor">
+            <a:schemeClr val="tx1"/>
+          </a:fontRef>
+        </p:style>
+      </p:cxnSp>
+      <p:cxnSp>
+        <p:nvCxnSpPr>
+          <p:cNvPr id="42" name="Straight Arrow Connector 41"/>
+          <p:cNvCxnSpPr>
+            <a:endCxn id="6" idx="2"/>
+          </p:cNvCxnSpPr>
+          <p:nvPr/>
+        </p:nvCxnSpPr>
+        <p:spPr>
+          <a:xfrm flipV="1">
+            <a:off x="4686836" y="1994891"/>
+            <a:ext cx="0" cy="333262"/>
+          </a:xfrm>
+          <a:prstGeom prst="straightConnector1">
+            <a:avLst/>
+          </a:prstGeom>
+          <a:ln w="57150">
+            <a:tailEnd type="triangle"/>
+          </a:ln>
+        </p:spPr>
+        <p:style>
+          <a:lnRef idx="1">
+            <a:schemeClr val="accent1"/>
+          </a:lnRef>
+          <a:fillRef idx="0">
+            <a:schemeClr val="accent1"/>
+          </a:fillRef>
+          <a:effectRef idx="0">
+            <a:schemeClr val="accent1"/>
+          </a:effectRef>
+          <a:fontRef idx="minor">
+            <a:schemeClr val="tx1"/>
+          </a:fontRef>
+        </p:style>
+      </p:cxnSp>
+      <p:cxnSp>
+        <p:nvCxnSpPr>
+          <p:cNvPr id="44" name="Straight Arrow Connector 43"/>
+          <p:cNvCxnSpPr>
+            <a:stCxn id="30" idx="3"/>
+            <a:endCxn id="6" idx="3"/>
+          </p:cNvCxnSpPr>
+          <p:nvPr/>
+        </p:nvCxnSpPr>
+        <p:spPr>
+          <a:xfrm flipV="1">
+            <a:off x="3212908" y="1682726"/>
+            <a:ext cx="1156188" cy="813"/>
+          </a:xfrm>
+          <a:prstGeom prst="straightConnector1">
+            <a:avLst/>
+          </a:prstGeom>
+          <a:ln w="57150">
+            <a:tailEnd type="triangle"/>
+          </a:ln>
+        </p:spPr>
+        <p:style>
+          <a:lnRef idx="1">
+            <a:schemeClr val="accent1"/>
+          </a:lnRef>
+          <a:fillRef idx="0">
+            <a:schemeClr val="accent1"/>
+          </a:fillRef>
+          <a:effectRef idx="0">
+            <a:schemeClr val="accent1"/>
+          </a:effectRef>
+          <a:fontRef idx="minor">
+            <a:schemeClr val="tx1"/>
+          </a:fontRef>
+        </p:style>
+      </p:cxnSp>
+      <p:cxnSp>
+        <p:nvCxnSpPr>
+          <p:cNvPr id="50" name="Straight Arrow Connector 49"/>
+          <p:cNvCxnSpPr>
+            <a:stCxn id="6" idx="1"/>
+          </p:cNvCxnSpPr>
+          <p:nvPr/>
+        </p:nvCxnSpPr>
+        <p:spPr>
+          <a:xfrm flipV="1">
+            <a:off x="5004576" y="1682725"/>
+            <a:ext cx="632332" cy="1"/>
+          </a:xfrm>
+          <a:prstGeom prst="straightConnector1">
+            <a:avLst/>
+          </a:prstGeom>
+          <a:ln w="57150">
+            <a:tailEnd type="triangle"/>
+          </a:ln>
+        </p:spPr>
+        <p:style>
+          <a:lnRef idx="1">
+            <a:schemeClr val="accent1"/>
+          </a:lnRef>
+          <a:fillRef idx="0">
+            <a:schemeClr val="accent1"/>
+          </a:fillRef>
+          <a:effectRef idx="0">
+            <a:schemeClr val="accent1"/>
+          </a:effectRef>
+          <a:fontRef idx="minor">
+            <a:schemeClr val="tx1"/>
+          </a:fontRef>
+        </p:style>
+      </p:cxnSp>
+      <p:cxnSp>
+        <p:nvCxnSpPr>
+          <p:cNvPr id="59" name="Straight Arrow Connector 58"/>
+          <p:cNvCxnSpPr>
+            <a:stCxn id="28" idx="1"/>
+          </p:cNvCxnSpPr>
+          <p:nvPr/>
+        </p:nvCxnSpPr>
+        <p:spPr>
+          <a:xfrm flipH="1" flipV="1">
+            <a:off x="7043575" y="2277108"/>
+            <a:ext cx="705792" cy="2242"/>
+          </a:xfrm>
+          <a:prstGeom prst="straightConnector1">
+            <a:avLst/>
+          </a:prstGeom>
+          <a:ln w="57150">
+            <a:tailEnd type="triangle"/>
+          </a:ln>
+        </p:spPr>
+        <p:style>
+          <a:lnRef idx="1">
+            <a:schemeClr val="accent1"/>
+          </a:lnRef>
+          <a:fillRef idx="0">
+            <a:schemeClr val="accent1"/>
+          </a:fillRef>
+          <a:effectRef idx="0">
+            <a:schemeClr val="accent1"/>
+          </a:effectRef>
+          <a:fontRef idx="minor">
+            <a:schemeClr val="tx1"/>
+          </a:fontRef>
+        </p:style>
+      </p:cxnSp>
+      <p:cxnSp>
+        <p:nvCxnSpPr>
+          <p:cNvPr id="62" name="Straight Arrow Connector 61"/>
+          <p:cNvCxnSpPr>
+            <a:stCxn id="9" idx="1"/>
+          </p:cNvCxnSpPr>
+          <p:nvPr/>
+        </p:nvCxnSpPr>
+        <p:spPr>
+          <a:xfrm flipH="1" flipV="1">
+            <a:off x="7043575" y="950741"/>
+            <a:ext cx="673647" cy="597"/>
+          </a:xfrm>
+          <a:prstGeom prst="straightConnector1">
+            <a:avLst/>
+          </a:prstGeom>
+          <a:ln w="57150">
+            <a:tailEnd type="triangle"/>
+          </a:ln>
+        </p:spPr>
+        <p:style>
+          <a:lnRef idx="1">
+            <a:schemeClr val="accent1"/>
+          </a:lnRef>
+          <a:fillRef idx="0">
+            <a:schemeClr val="accent1"/>
+          </a:fillRef>
+          <a:effectRef idx="0">
+            <a:schemeClr val="accent1"/>
+          </a:effectRef>
+          <a:fontRef idx="minor">
+            <a:schemeClr val="tx1"/>
+          </a:fontRef>
+        </p:style>
+      </p:cxnSp>
+      <p:sp>
+        <p:nvSpPr>
+          <p:cNvPr id="1048" name="Rectangle 1047"/>
+          <p:cNvSpPr/>
+          <p:nvPr/>
+        </p:nvSpPr>
+        <p:spPr>
+          <a:xfrm>
+            <a:off x="5636908" y="445342"/>
+            <a:ext cx="1443344" cy="2395960"/>
+          </a:xfrm>
+          <a:prstGeom prst="rect">
+            <a:avLst/>
+          </a:prstGeom>
+          <a:noFill/>
+          <a:ln w="19050">
+            <a:solidFill>
+              <a:srgbClr val="00B0F0"/>
+            </a:solidFill>
+          </a:ln>
+        </p:spPr>
+        <p:style>
+          <a:lnRef idx="2">
+            <a:schemeClr val="accent1">
+              <a:shade val="50000"/>
+            </a:schemeClr>
+          </a:lnRef>
+          <a:fillRef idx="1">
+            <a:schemeClr val="accent1"/>
+          </a:fillRef>
+          <a:effectRef idx="0">
+            <a:schemeClr val="accent1"/>
+          </a:effectRef>
+          <a:fontRef idx="minor">
+            <a:schemeClr val="lt1"/>
+          </a:fontRef>
+        </p:style>
+        <p:txBody>
+          <a:bodyPr rtlCol="0" anchor="ctr"/>
+          <a:lstStyle/>
+          <a:p>
+            <a:pPr algn="ctr"/>
+            <a:endParaRPr lang="de-DE"/>
+          </a:p>
+        </p:txBody>
+      </p:sp>
+      <p:cxnSp>
+        <p:nvCxnSpPr>
+          <p:cNvPr id="69" name="Straight Arrow Connector 68"/>
+          <p:cNvCxnSpPr>
+            <a:stCxn id="28" idx="2"/>
+            <a:endCxn id="1034" idx="0"/>
+          </p:cNvCxnSpPr>
+          <p:nvPr/>
+        </p:nvCxnSpPr>
+        <p:spPr>
+          <a:xfrm flipH="1">
+            <a:off x="5148274" y="2592844"/>
+            <a:ext cx="2928709" cy="1371499"/>
+          </a:xfrm>
+          <a:prstGeom prst="straightConnector1">
+            <a:avLst/>
+          </a:prstGeom>
+          <a:ln w="57150">
+            <a:tailEnd type="triangle"/>
+          </a:ln>
+        </p:spPr>
+        <p:style>
+          <a:lnRef idx="1">
+            <a:schemeClr val="accent1"/>
+          </a:lnRef>
+          <a:fillRef idx="0">
+            <a:schemeClr val="accent1"/>
+          </a:fillRef>
+          <a:effectRef idx="0">
+            <a:schemeClr val="accent1"/>
+          </a:effectRef>
+          <a:fontRef idx="minor">
+            <a:schemeClr val="tx1"/>
+          </a:fontRef>
+        </p:style>
+      </p:cxnSp>
+      <p:cxnSp>
+        <p:nvCxnSpPr>
+          <p:cNvPr id="72" name="Straight Arrow Connector 71"/>
+          <p:cNvCxnSpPr>
+            <a:stCxn id="1026" idx="1"/>
+            <a:endCxn id="1032" idx="0"/>
+          </p:cNvCxnSpPr>
+          <p:nvPr/>
+        </p:nvCxnSpPr>
+        <p:spPr>
+          <a:xfrm flipH="1">
+            <a:off x="5902256" y="2262651"/>
+            <a:ext cx="3459757" cy="1701692"/>
+          </a:xfrm>
+          <a:prstGeom prst="straightConnector1">
+            <a:avLst/>
+          </a:prstGeom>
+          <a:ln w="57150">
+            <a:headEnd type="triangle"/>
+            <a:tailEnd type="triangle"/>
+          </a:ln>
+        </p:spPr>
+        <p:style>
+          <a:lnRef idx="1">
+            <a:schemeClr val="accent1"/>
+          </a:lnRef>
+          <a:fillRef idx="0">
+            <a:schemeClr val="accent1"/>
+          </a:fillRef>
+          <a:effectRef idx="0">
+            <a:schemeClr val="accent1"/>
+          </a:effectRef>
+          <a:fontRef idx="minor">
+            <a:schemeClr val="tx1"/>
+          </a:fontRef>
+        </p:style>
+      </p:cxnSp>
+      <p:cxnSp>
+        <p:nvCxnSpPr>
+          <p:cNvPr id="75" name="Straight Arrow Connector 74"/>
+          <p:cNvCxnSpPr>
+            <a:stCxn id="9" idx="3"/>
+            <a:endCxn id="23" idx="0"/>
+          </p:cNvCxnSpPr>
+          <p:nvPr/>
+        </p:nvCxnSpPr>
+        <p:spPr>
+          <a:xfrm>
+            <a:off x="8372453" y="951338"/>
+            <a:ext cx="1296576" cy="681168"/>
+          </a:xfrm>
+          <a:prstGeom prst="straightConnector1">
+            <a:avLst/>
+          </a:prstGeom>
+          <a:ln w="57150">
+            <a:headEnd type="triangle"/>
+            <a:tailEnd type="triangle"/>
+          </a:ln>
+        </p:spPr>
+        <p:style>
+          <a:lnRef idx="1">
+            <a:schemeClr val="accent1"/>
+          </a:lnRef>
+          <a:fillRef idx="0">
+            <a:schemeClr val="accent1"/>
+          </a:fillRef>
+          <a:effectRef idx="0">
+            <a:schemeClr val="accent1"/>
+          </a:effectRef>
+          <a:fontRef idx="minor">
+            <a:schemeClr val="tx1"/>
+          </a:fontRef>
+        </p:style>
+      </p:cxnSp>
+      <p:sp>
+        <p:nvSpPr>
+          <p:cNvPr id="35" name="Cloud 34"/>
+          <p:cNvSpPr/>
+          <p:nvPr/>
+        </p:nvSpPr>
+        <p:spPr>
+          <a:xfrm>
+            <a:off x="1063925" y="0"/>
+            <a:ext cx="10668000" cy="3807125"/>
+          </a:xfrm>
+          <a:prstGeom prst="cloud">
+            <a:avLst/>
+          </a:prstGeom>
+          <a:noFill/>
+          <a:ln w="28575">
+            <a:solidFill>
+              <a:schemeClr val="accent1"/>
+            </a:solidFill>
+          </a:ln>
+        </p:spPr>
+        <p:style>
+          <a:lnRef idx="2">
+            <a:schemeClr val="accent1">
+              <a:shade val="50000"/>
+            </a:schemeClr>
+          </a:lnRef>
+          <a:fillRef idx="1">
+            <a:schemeClr val="accent1"/>
+          </a:fillRef>
+          <a:effectRef idx="0">
+            <a:schemeClr val="accent1"/>
+          </a:effectRef>
+          <a:fontRef idx="minor">
+            <a:schemeClr val="lt1"/>
+          </a:fontRef>
+        </p:style>
+        <p:txBody>
+          <a:bodyPr rtlCol="0" anchor="ctr"/>
+          <a:lstStyle/>
+          <a:p>
+            <a:pPr algn="ctr"/>
+            <a:endParaRPr lang="de-DE"/>
+          </a:p>
+        </p:txBody>
+      </p:sp>
+    </p:spTree>
+    <p:extLst>
+      <p:ext uri="{BB962C8B-B14F-4D97-AF65-F5344CB8AC3E}">
+        <p14:creationId xmlns:p14="http://schemas.microsoft.com/office/powerpoint/2010/main" val="3219074629"/>
       </p:ext>
     </p:extLst>
   </p:cSld>

</xml_diff>